<commit_message>
updates for command line, junit5 and exceptions
</commit_message>
<xml_diff>
--- a/command-line-basics.pptx
+++ b/command-line-basics.pptx
@@ -6526,7 +6526,15 @@
             <a:pPr lvl="1"/>
             <a:r>
               <a:rPr lang="en-US" dirty="0"/>
-              <a:t>man (POSIX)</a:t>
+              <a:t>apropos &lt;keyword&gt;, man &lt;</a:t>
+            </a:r>
+            <a:r>
+              <a:rPr lang="en-US" dirty="0" err="1"/>
+              <a:t>cmd</a:t>
+            </a:r>
+            <a:r>
+              <a:rPr lang="en-US" dirty="0"/>
+              <a:t>&gt; (POSIX)</a:t>
             </a:r>
           </a:p>
           <a:p>
@@ -6631,7 +6639,7 @@
             <a:pPr lvl="2"/>
             <a:r>
               <a:rPr lang="en-US" dirty="0"/>
-              <a:t>/Users</a:t>
+              <a:t>/Users/&lt;login&gt;</a:t>
             </a:r>
           </a:p>
           <a:p>

</xml_diff>